<commit_message>
Added blog system lecture + example
</commit_message>
<xml_diff>
--- a/lectures/14. Practical Project - Demo.pptx
+++ b/lectures/14. Practical Project - Demo.pptx
@@ -267,7 +267,7 @@
             <a:fld id="{3BF7C7B5-275F-4D1F-9AB4-9255447DBC73}" type="datetimeFigureOut">
               <a:rPr lang="en-US"/>
               <a:pPr/>
-              <a:t>17-May-10</a:t>
+              <a:t>18-May-10</a:t>
             </a:fld>
             <a:endParaRPr lang="en-US" dirty="0"/>
           </a:p>
@@ -493,7 +493,7 @@
             <a:fld id="{9B46F231-FB2B-4655-A644-E2477325E686}" type="datetimeFigureOut">
               <a:rPr lang="en-US"/>
               <a:pPr/>
-              <a:t>17-May-10</a:t>
+              <a:t>18-May-10</a:t>
             </a:fld>
             <a:endParaRPr lang="en-US" dirty="0"/>
           </a:p>
@@ -3912,7 +3912,6 @@
               <a:rPr lang="bg-BG" dirty="0" smtClean="0"/>
               <a:t>:</a:t>
             </a:r>
-            <a:endParaRPr lang="bg-BG" dirty="0" smtClean="0"/>
           </a:p>
           <a:p>
             <a:pPr marL="871538" lvl="1" indent="-514350">
@@ -4694,29 +4693,6 @@
       </p:sp>
       <p:sp>
         <p:nvSpPr>
-          <p:cNvPr id="3" name="Content Placeholder 2"/>
-          <p:cNvSpPr>
-            <a:spLocks noGrp="1"/>
-          </p:cNvSpPr>
-          <p:nvPr>
-            <p:ph idx="1"/>
-          </p:nvPr>
-        </p:nvSpPr>
-        <p:spPr/>
-        <p:txBody>
-          <a:bodyPr/>
-          <a:lstStyle/>
-          <a:p>
-            <a:r>
-              <a:rPr lang="en-US" dirty="0" smtClean="0"/>
-              <a:t>…</a:t>
-            </a:r>
-            <a:endParaRPr lang="en-US" dirty="0"/>
-          </a:p>
-        </p:txBody>
-      </p:sp>
-      <p:sp>
-        <p:nvSpPr>
           <p:cNvPr id="4" name="Slide Number Placeholder 3"/>
           <p:cNvSpPr>
             <a:spLocks noGrp="1"/>
@@ -4744,6 +4720,38 @@
           </a:p>
         </p:txBody>
       </p:sp>
+      <p:pic>
+        <p:nvPicPr>
+          <p:cNvPr id="1027" name="Picture 3"/>
+          <p:cNvPicPr>
+            <a:picLocks noChangeAspect="1" noChangeArrowheads="1"/>
+          </p:cNvPicPr>
+          <p:nvPr/>
+        </p:nvPicPr>
+        <p:blipFill>
+          <a:blip r:embed="rId2" cstate="print"/>
+          <a:srcRect/>
+          <a:stretch>
+            <a:fillRect/>
+          </a:stretch>
+        </p:blipFill>
+        <p:spPr bwMode="auto">
+          <a:xfrm>
+            <a:off x="762000" y="1143000"/>
+            <a:ext cx="7467600" cy="5192986"/>
+          </a:xfrm>
+          <a:prstGeom prst="rect">
+            <a:avLst/>
+          </a:prstGeom>
+          <a:noFill/>
+          <a:ln w="9525">
+            <a:noFill/>
+            <a:miter lim="800000"/>
+            <a:headEnd/>
+            <a:tailEnd/>
+          </a:ln>
+        </p:spPr>
+      </p:pic>
     </p:spTree>
   </p:cSld>
   <p:clrMapOvr>
@@ -4809,9 +4817,32 @@
           <a:p>
             <a:r>
               <a:rPr lang="en-US" dirty="0" smtClean="0"/>
-              <a:t>…</a:t>
-            </a:r>
-            <a:endParaRPr lang="en-US" dirty="0"/>
+              <a:t>What happens when no posts are available in the system?</a:t>
+            </a:r>
+          </a:p>
+          <a:p>
+            <a:r>
+              <a:rPr lang="en-US" dirty="0" smtClean="0"/>
+              <a:t>What happens when no comment are entered for given post?</a:t>
+            </a:r>
+          </a:p>
+          <a:p>
+            <a:r>
+              <a:rPr lang="en-US" dirty="0" smtClean="0"/>
+              <a:t>What happens when the posts are too much (e.g. 500)?</a:t>
+            </a:r>
+          </a:p>
+          <a:p>
+            <a:r>
+              <a:rPr lang="en-US" dirty="0" smtClean="0"/>
+              <a:t>How "create post" behaves with an empty form?</a:t>
+            </a:r>
+          </a:p>
+          <a:p>
+            <a:r>
+              <a:rPr lang="en-US" dirty="0" smtClean="0"/>
+              <a:t>What happens if in a field of size 50 characters we enter 100 characters?</a:t>
+            </a:r>
           </a:p>
         </p:txBody>
       </p:sp>

</xml_diff>